<commit_message>
WOL and shutdown fixed and more fixes
</commit_message>
<xml_diff>
--- a/Presentation1.pptx
+++ b/Presentation1.pptx
@@ -290,7 +290,7 @@
           <a:p>
             <a:fld id="{48BCBA73-816B-4566-B703-07B58B98228C}" type="datetimeFigureOut">
               <a:rPr lang="en-GB" smtClean="0"/>
-              <a:t>10/04/2016</a:t>
+              <a:t>01/05/2016</a:t>
             </a:fld>
             <a:endParaRPr lang="en-GB"/>
           </a:p>
@@ -460,7 +460,7 @@
           <a:p>
             <a:fld id="{48BCBA73-816B-4566-B703-07B58B98228C}" type="datetimeFigureOut">
               <a:rPr lang="en-GB" smtClean="0"/>
-              <a:t>10/04/2016</a:t>
+              <a:t>01/05/2016</a:t>
             </a:fld>
             <a:endParaRPr lang="en-GB"/>
           </a:p>
@@ -640,7 +640,7 @@
           <a:p>
             <a:fld id="{48BCBA73-816B-4566-B703-07B58B98228C}" type="datetimeFigureOut">
               <a:rPr lang="en-GB" smtClean="0"/>
-              <a:t>10/04/2016</a:t>
+              <a:t>01/05/2016</a:t>
             </a:fld>
             <a:endParaRPr lang="en-GB"/>
           </a:p>
@@ -810,7 +810,7 @@
           <a:p>
             <a:fld id="{48BCBA73-816B-4566-B703-07B58B98228C}" type="datetimeFigureOut">
               <a:rPr lang="en-GB" smtClean="0"/>
-              <a:t>10/04/2016</a:t>
+              <a:t>01/05/2016</a:t>
             </a:fld>
             <a:endParaRPr lang="en-GB"/>
           </a:p>
@@ -1056,7 +1056,7 @@
           <a:p>
             <a:fld id="{48BCBA73-816B-4566-B703-07B58B98228C}" type="datetimeFigureOut">
               <a:rPr lang="en-GB" smtClean="0"/>
-              <a:t>10/04/2016</a:t>
+              <a:t>01/05/2016</a:t>
             </a:fld>
             <a:endParaRPr lang="en-GB"/>
           </a:p>
@@ -1344,7 +1344,7 @@
           <a:p>
             <a:fld id="{48BCBA73-816B-4566-B703-07B58B98228C}" type="datetimeFigureOut">
               <a:rPr lang="en-GB" smtClean="0"/>
-              <a:t>10/04/2016</a:t>
+              <a:t>01/05/2016</a:t>
             </a:fld>
             <a:endParaRPr lang="en-GB"/>
           </a:p>
@@ -1766,7 +1766,7 @@
           <a:p>
             <a:fld id="{48BCBA73-816B-4566-B703-07B58B98228C}" type="datetimeFigureOut">
               <a:rPr lang="en-GB" smtClean="0"/>
-              <a:t>10/04/2016</a:t>
+              <a:t>01/05/2016</a:t>
             </a:fld>
             <a:endParaRPr lang="en-GB"/>
           </a:p>
@@ -1884,7 +1884,7 @@
           <a:p>
             <a:fld id="{48BCBA73-816B-4566-B703-07B58B98228C}" type="datetimeFigureOut">
               <a:rPr lang="en-GB" smtClean="0"/>
-              <a:t>10/04/2016</a:t>
+              <a:t>01/05/2016</a:t>
             </a:fld>
             <a:endParaRPr lang="en-GB"/>
           </a:p>
@@ -1979,7 +1979,7 @@
           <a:p>
             <a:fld id="{48BCBA73-816B-4566-B703-07B58B98228C}" type="datetimeFigureOut">
               <a:rPr lang="en-GB" smtClean="0"/>
-              <a:t>10/04/2016</a:t>
+              <a:t>01/05/2016</a:t>
             </a:fld>
             <a:endParaRPr lang="en-GB"/>
           </a:p>
@@ -2256,7 +2256,7 @@
           <a:p>
             <a:fld id="{48BCBA73-816B-4566-B703-07B58B98228C}" type="datetimeFigureOut">
               <a:rPr lang="en-GB" smtClean="0"/>
-              <a:t>10/04/2016</a:t>
+              <a:t>01/05/2016</a:t>
             </a:fld>
             <a:endParaRPr lang="en-GB"/>
           </a:p>
@@ -2509,7 +2509,7 @@
           <a:p>
             <a:fld id="{48BCBA73-816B-4566-B703-07B58B98228C}" type="datetimeFigureOut">
               <a:rPr lang="en-GB" smtClean="0"/>
-              <a:t>10/04/2016</a:t>
+              <a:t>01/05/2016</a:t>
             </a:fld>
             <a:endParaRPr lang="en-GB"/>
           </a:p>
@@ -2722,7 +2722,7 @@
           <a:p>
             <a:fld id="{48BCBA73-816B-4566-B703-07B58B98228C}" type="datetimeFigureOut">
               <a:rPr lang="en-GB" smtClean="0"/>
-              <a:t>10/04/2016</a:t>
+              <a:t>01/05/2016</a:t>
             </a:fld>
             <a:endParaRPr lang="en-GB"/>
           </a:p>
@@ -3220,7 +3220,7 @@
         <p:spPr/>
         <p:txBody>
           <a:bodyPr>
-            <a:normAutofit fontScale="92500" lnSpcReduction="10000"/>
+            <a:normAutofit/>
           </a:bodyPr>
           <a:lstStyle/>
           <a:p>
@@ -3258,22 +3258,11 @@
             <a:pPr algn="r" rtl="1"/>
             <a:r>
               <a:rPr lang="he-IL" dirty="0" smtClean="0"/>
-              <a:t>בדף של ה</a:t>
-            </a:r>
-            <a:r>
-              <a:rPr lang="en-US" dirty="0" smtClean="0"/>
-              <a:t>processes</a:t>
+              <a:t>להקטין </a:t>
             </a:r>
             <a:r>
               <a:rPr lang="he-IL" dirty="0" smtClean="0"/>
-              <a:t> – לציין גם שם ולהפריד בפסיק בהודעה.</a:t>
-            </a:r>
-          </a:p>
-          <a:p>
-            <a:pPr algn="r" rtl="1"/>
-            <a:r>
-              <a:rPr lang="he-IL" dirty="0" smtClean="0"/>
-              <a:t>להקטין תא ראשון בטבלה</a:t>
+              <a:t>תא ראשון בטבלה</a:t>
             </a:r>
           </a:p>
           <a:p>
@@ -3286,53 +3275,8 @@
           <a:p>
             <a:pPr algn="r" rtl="1"/>
             <a:r>
-              <a:rPr lang="en-US" dirty="0" smtClean="0"/>
+              <a:rPr lang="en-US" smtClean="0"/>
               <a:t>Download</a:t>
-            </a:r>
-            <a:endParaRPr lang="he-IL" dirty="0" smtClean="0"/>
-          </a:p>
-          <a:p>
-            <a:pPr marL="0" indent="0" algn="r" rtl="1">
-              <a:buNone/>
-            </a:pPr>
-            <a:r>
-              <a:rPr lang="en-US" dirty="0" smtClean="0"/>
-              <a:t> </a:t>
-            </a:r>
-            <a:r>
-              <a:rPr lang="he-IL" dirty="0" smtClean="0"/>
-              <a:t>בדף של </a:t>
-            </a:r>
-            <a:r>
-              <a:rPr lang="en-US" dirty="0" smtClean="0"/>
-              <a:t>WOL</a:t>
-            </a:r>
-            <a:r>
-              <a:rPr lang="he-IL" dirty="0" smtClean="0"/>
-              <a:t> להציג רשימת מחשבים.</a:t>
-            </a:r>
-          </a:p>
-          <a:p>
-            <a:pPr algn="r" rtl="1"/>
-            <a:r>
-              <a:rPr lang="en-US" dirty="0" smtClean="0"/>
-              <a:t>WOL</a:t>
-            </a:r>
-            <a:r>
-              <a:rPr lang="he-IL" dirty="0" smtClean="0"/>
-              <a:t> ו - </a:t>
-            </a:r>
-            <a:r>
-              <a:rPr lang="en-US" dirty="0" smtClean="0"/>
-              <a:t>Shutdown</a:t>
-            </a:r>
-            <a:r>
-              <a:rPr lang="he-IL" dirty="0" smtClean="0"/>
-              <a:t> </a:t>
-            </a:r>
-            <a:r>
-              <a:rPr lang="he-IL" smtClean="0"/>
-              <a:t>לא עובד</a:t>
             </a:r>
             <a:endParaRPr lang="he-IL" dirty="0" smtClean="0"/>
           </a:p>

</xml_diff>